<commit_message>
minor tweak on talk
</commit_message>
<xml_diff>
--- a/plugins/vdm2isa/pub/isq-lib/talk/International System of Quantities library in VDM.pptx
+++ b/plugins/vdm2isa/pub/isq-lib/talk/International System of Quantities library in VDM.pptx
@@ -5,7 +5,7 @@
     <p:sldMasterId id="2147483648" r:id="rId1"/>
   </p:sldMasterIdLst>
   <p:notesMasterIdLst>
-    <p:notesMasterId r:id="rId17"/>
+    <p:notesMasterId r:id="rId18"/>
   </p:notesMasterIdLst>
   <p:sldIdLst>
     <p:sldId id="256" r:id="rId2"/>
@@ -20,9 +20,10 @@
     <p:sldId id="266" r:id="rId11"/>
     <p:sldId id="271" r:id="rId12"/>
     <p:sldId id="267" r:id="rId13"/>
-    <p:sldId id="272" r:id="rId14"/>
-    <p:sldId id="270" r:id="rId15"/>
-    <p:sldId id="269" r:id="rId16"/>
+    <p:sldId id="274" r:id="rId14"/>
+    <p:sldId id="272" r:id="rId15"/>
+    <p:sldId id="270" r:id="rId16"/>
+    <p:sldId id="269" r:id="rId17"/>
   </p:sldIdLst>
   <p:sldSz cx="12192000" cy="6858000"/>
   <p:notesSz cx="6858000" cy="9144000"/>
@@ -12578,6 +12579,1175 @@
           <a:p>
             <a:r>
               <a:rPr lang="en-GB" dirty="0"/>
+              <a:t>Checking functions example</a:t>
+            </a:r>
+          </a:p>
+        </p:txBody>
+      </p:sp>
+      <p:sp>
+        <p:nvSpPr>
+          <p:cNvPr id="3" name="Content Placeholder 2">
+            <a:extLst>
+              <a:ext uri="{FF2B5EF4-FFF2-40B4-BE49-F238E27FC236}">
+                <a16:creationId xmlns:a16="http://schemas.microsoft.com/office/drawing/2014/main" id="{C1956BD9-47E7-09DC-2FC2-0E9152754BCC}"/>
+              </a:ext>
+            </a:extLst>
+          </p:cNvPr>
+          <p:cNvSpPr>
+            <a:spLocks noGrp="1"/>
+          </p:cNvSpPr>
+          <p:nvPr>
+            <p:ph idx="1"/>
+          </p:nvPr>
+        </p:nvSpPr>
+        <p:spPr/>
+        <p:txBody>
+          <a:bodyPr>
+            <a:normAutofit fontScale="62500" lnSpcReduction="20000"/>
+          </a:bodyPr>
+          <a:lstStyle/>
+          <a:p>
+            <a:pPr marL="0" indent="0">
+              <a:buNone/>
+            </a:pPr>
+            <a:r>
+              <a:rPr lang="en-GB" dirty="0">
+                <a:solidFill>
+                  <a:srgbClr val="000000"/>
+                </a:solidFill>
+                <a:effectLst/>
+                <a:latin typeface="Menlo" panose="020B0609030804020204" pitchFamily="49" charset="0"/>
+              </a:rPr>
+              <a:t>&gt; script ./</a:t>
+            </a:r>
+            <a:r>
+              <a:rPr lang="en-GB" dirty="0" err="1">
+                <a:solidFill>
+                  <a:srgbClr val="000000"/>
+                </a:solidFill>
+                <a:effectLst/>
+                <a:latin typeface="Menlo" panose="020B0609030804020204" pitchFamily="49" charset="0"/>
+              </a:rPr>
+              <a:t>src</a:t>
+            </a:r>
+            <a:r>
+              <a:rPr lang="en-GB" dirty="0">
+                <a:solidFill>
+                  <a:srgbClr val="000000"/>
+                </a:solidFill>
+                <a:effectLst/>
+                <a:latin typeface="Menlo" panose="020B0609030804020204" pitchFamily="49" charset="0"/>
+              </a:rPr>
+              <a:t>/main/resources/</a:t>
+            </a:r>
+            <a:r>
+              <a:rPr lang="en-GB" dirty="0" err="1">
+                <a:solidFill>
+                  <a:srgbClr val="000000"/>
+                </a:solidFill>
+                <a:effectLst/>
+                <a:latin typeface="Menlo" panose="020B0609030804020204" pitchFamily="49" charset="0"/>
+              </a:rPr>
+              <a:t>ISQ.script</a:t>
+            </a:r>
+            <a:endParaRPr lang="en-GB" dirty="0">
+              <a:solidFill>
+                <a:srgbClr val="000000"/>
+              </a:solidFill>
+              <a:effectLst/>
+              <a:latin typeface="Menlo" panose="020B0609030804020204" pitchFamily="49" charset="0"/>
+            </a:endParaRPr>
+          </a:p>
+          <a:p>
+            <a:pPr marL="0" indent="0">
+              <a:buNone/>
+            </a:pPr>
+            <a:endParaRPr lang="en-GB" dirty="0">
+              <a:solidFill>
+                <a:srgbClr val="000000"/>
+              </a:solidFill>
+              <a:effectLst/>
+              <a:latin typeface="Menlo" panose="020B0609030804020204" pitchFamily="49" charset="0"/>
+            </a:endParaRPr>
+          </a:p>
+          <a:p>
+            <a:pPr marL="0" indent="0">
+              <a:buNone/>
+            </a:pPr>
+            <a:r>
+              <a:rPr lang="en-GB" dirty="0">
+                <a:solidFill>
+                  <a:srgbClr val="000000"/>
+                </a:solidFill>
+                <a:effectLst/>
+                <a:latin typeface="Menlo" panose="020B0609030804020204" pitchFamily="49" charset="0"/>
+              </a:rPr>
+              <a:t>p let PA = </a:t>
+            </a:r>
+            <a:r>
+              <a:rPr lang="en-GB" dirty="0" err="1">
+                <a:solidFill>
+                  <a:srgbClr val="000000"/>
+                </a:solidFill>
+                <a:effectLst/>
+                <a:latin typeface="Menlo" panose="020B0609030804020204" pitchFamily="49" charset="0"/>
+              </a:rPr>
+              <a:t>ms_div</a:t>
+            </a:r>
+            <a:r>
+              <a:rPr lang="en-GB" dirty="0">
+                <a:solidFill>
+                  <a:srgbClr val="000000"/>
+                </a:solidFill>
+                <a:effectLst/>
+                <a:latin typeface="Menlo" panose="020B0609030804020204" pitchFamily="49" charset="0"/>
+              </a:rPr>
+              <a:t>(KILOGRAM, SI_ACCELERATION) in </a:t>
+            </a:r>
+          </a:p>
+          <a:p>
+            <a:pPr marL="0" indent="0">
+              <a:buNone/>
+            </a:pPr>
+            <a:r>
+              <a:rPr lang="en-GB" dirty="0">
+                <a:solidFill>
+                  <a:srgbClr val="000000"/>
+                </a:solidFill>
+                <a:effectLst/>
+                <a:latin typeface="Menlo" panose="020B0609030804020204" pitchFamily="49" charset="0"/>
+              </a:rPr>
+              <a:t>             </a:t>
+            </a:r>
+            <a:r>
+              <a:rPr lang="en-GB" dirty="0" err="1">
+                <a:solidFill>
+                  <a:srgbClr val="000000"/>
+                </a:solidFill>
+                <a:effectLst/>
+                <a:latin typeface="Menlo" panose="020B0609030804020204" pitchFamily="49" charset="0"/>
+              </a:rPr>
+              <a:t>mk</a:t>
+            </a:r>
+            <a:r>
+              <a:rPr lang="en-GB" dirty="0">
+                <a:solidFill>
+                  <a:srgbClr val="000000"/>
+                </a:solidFill>
+                <a:effectLst/>
+                <a:latin typeface="Menlo" panose="020B0609030804020204" pitchFamily="49" charset="0"/>
+              </a:rPr>
+              <a:t>_(</a:t>
+            </a:r>
+            <a:r>
+              <a:rPr lang="en-GB" dirty="0" err="1">
+                <a:solidFill>
+                  <a:srgbClr val="000000"/>
+                </a:solidFill>
+                <a:effectLst/>
+                <a:latin typeface="Menlo" panose="020B0609030804020204" pitchFamily="49" charset="0"/>
+              </a:rPr>
+              <a:t>is_Pressure</a:t>
+            </a:r>
+            <a:r>
+              <a:rPr lang="en-GB" dirty="0">
+                <a:solidFill>
+                  <a:srgbClr val="000000"/>
+                </a:solidFill>
+                <a:effectLst/>
+                <a:latin typeface="Menlo" panose="020B0609030804020204" pitchFamily="49" charset="0"/>
+              </a:rPr>
+              <a:t>(PA), </a:t>
+            </a:r>
+            <a:r>
+              <a:rPr lang="en-GB" dirty="0" err="1">
+                <a:solidFill>
+                  <a:srgbClr val="000000"/>
+                </a:solidFill>
+                <a:effectLst/>
+                <a:latin typeface="Menlo" panose="020B0609030804020204" pitchFamily="49" charset="0"/>
+              </a:rPr>
+              <a:t>si_dim_view</a:t>
+            </a:r>
+            <a:r>
+              <a:rPr lang="en-GB" dirty="0">
+                <a:solidFill>
+                  <a:srgbClr val="000000"/>
+                </a:solidFill>
+                <a:effectLst/>
+                <a:latin typeface="Menlo" panose="020B0609030804020204" pitchFamily="49" charset="0"/>
+              </a:rPr>
+              <a:t>(PA))</a:t>
+            </a:r>
+          </a:p>
+          <a:p>
+            <a:pPr marL="0" indent="0">
+              <a:buNone/>
+            </a:pPr>
+            <a:r>
+              <a:rPr lang="en-GB" dirty="0">
+                <a:solidFill>
+                  <a:srgbClr val="000000"/>
+                </a:solidFill>
+                <a:effectLst/>
+                <a:latin typeface="Menlo" panose="020B0609030804020204" pitchFamily="49" charset="0"/>
+              </a:rPr>
+              <a:t>           = </a:t>
+            </a:r>
+            <a:r>
+              <a:rPr lang="en-GB" dirty="0" err="1">
+                <a:solidFill>
+                  <a:srgbClr val="000000"/>
+                </a:solidFill>
+                <a:effectLst/>
+                <a:latin typeface="Menlo" panose="020B0609030804020204" pitchFamily="49" charset="0"/>
+              </a:rPr>
+              <a:t>mk</a:t>
+            </a:r>
+            <a:r>
+              <a:rPr lang="en-GB" dirty="0">
+                <a:solidFill>
+                  <a:srgbClr val="000000"/>
+                </a:solidFill>
+                <a:effectLst/>
+                <a:latin typeface="Menlo" panose="020B0609030804020204" pitchFamily="49" charset="0"/>
+              </a:rPr>
+              <a:t>_(          false, "( kg (s**2)  ) / m ")</a:t>
+            </a:r>
+          </a:p>
+          <a:p>
+            <a:pPr marL="0" indent="0">
+              <a:buNone/>
+            </a:pPr>
+            <a:r>
+              <a:rPr lang="en-GB" dirty="0">
+                <a:solidFill>
+                  <a:srgbClr val="000000"/>
+                </a:solidFill>
+                <a:effectLst/>
+                <a:latin typeface="Menlo" panose="020B0609030804020204" pitchFamily="49" charset="0"/>
+              </a:rPr>
+              <a:t> </a:t>
+            </a:r>
+          </a:p>
+          <a:p>
+            <a:pPr marL="0" indent="0">
+              <a:buNone/>
+            </a:pPr>
+            <a:r>
+              <a:rPr lang="en-GB" dirty="0">
+                <a:solidFill>
+                  <a:srgbClr val="000000"/>
+                </a:solidFill>
+                <a:effectLst/>
+                <a:latin typeface="Menlo" panose="020B0609030804020204" pitchFamily="49" charset="0"/>
+              </a:rPr>
+              <a:t>p let PA = </a:t>
+            </a:r>
+            <a:r>
+              <a:rPr lang="en-GB" dirty="0" err="1">
+                <a:solidFill>
+                  <a:srgbClr val="000000"/>
+                </a:solidFill>
+                <a:effectLst/>
+                <a:latin typeface="Menlo" panose="020B0609030804020204" pitchFamily="49" charset="0"/>
+              </a:rPr>
+              <a:t>ms_div</a:t>
+            </a:r>
+            <a:r>
+              <a:rPr lang="en-GB" dirty="0">
+                <a:solidFill>
+                  <a:srgbClr val="000000"/>
+                </a:solidFill>
+                <a:effectLst/>
+                <a:latin typeface="Menlo" panose="020B0609030804020204" pitchFamily="49" charset="0"/>
+              </a:rPr>
+              <a:t>(KILOGRAM, </a:t>
+            </a:r>
+            <a:r>
+              <a:rPr lang="en-GB" dirty="0" err="1">
+                <a:solidFill>
+                  <a:srgbClr val="000000"/>
+                </a:solidFill>
+                <a:effectLst/>
+                <a:latin typeface="Menlo" panose="020B0609030804020204" pitchFamily="49" charset="0"/>
+              </a:rPr>
+              <a:t>ms_times</a:t>
+            </a:r>
+            <a:r>
+              <a:rPr lang="en-GB" dirty="0">
+                <a:solidFill>
+                  <a:srgbClr val="000000"/>
+                </a:solidFill>
+                <a:effectLst/>
+                <a:latin typeface="Menlo" panose="020B0609030804020204" pitchFamily="49" charset="0"/>
+              </a:rPr>
+              <a:t>(METER, </a:t>
+            </a:r>
+            <a:r>
+              <a:rPr lang="en-GB" dirty="0" err="1">
+                <a:solidFill>
+                  <a:srgbClr val="000000"/>
+                </a:solidFill>
+                <a:effectLst/>
+                <a:latin typeface="Menlo" panose="020B0609030804020204" pitchFamily="49" charset="0"/>
+              </a:rPr>
+              <a:t>ms_itself_n</a:t>
+            </a:r>
+            <a:r>
+              <a:rPr lang="en-GB" dirty="0">
+                <a:solidFill>
+                  <a:srgbClr val="000000"/>
+                </a:solidFill>
+                <a:effectLst/>
+                <a:latin typeface="Menlo" panose="020B0609030804020204" pitchFamily="49" charset="0"/>
+              </a:rPr>
+              <a:t>(SECOND, 2))) in  </a:t>
+            </a:r>
+          </a:p>
+          <a:p>
+            <a:pPr marL="0" indent="0">
+              <a:buNone/>
+            </a:pPr>
+            <a:r>
+              <a:rPr lang="en-GB" dirty="0">
+                <a:solidFill>
+                  <a:srgbClr val="000000"/>
+                </a:solidFill>
+                <a:effectLst/>
+                <a:latin typeface="Menlo" panose="020B0609030804020204" pitchFamily="49" charset="0"/>
+              </a:rPr>
+              <a:t>             </a:t>
+            </a:r>
+            <a:r>
+              <a:rPr lang="en-GB" dirty="0" err="1">
+                <a:solidFill>
+                  <a:srgbClr val="000000"/>
+                </a:solidFill>
+                <a:effectLst/>
+                <a:latin typeface="Menlo" panose="020B0609030804020204" pitchFamily="49" charset="0"/>
+              </a:rPr>
+              <a:t>mk</a:t>
+            </a:r>
+            <a:r>
+              <a:rPr lang="en-GB" dirty="0">
+                <a:solidFill>
+                  <a:srgbClr val="000000"/>
+                </a:solidFill>
+                <a:effectLst/>
+                <a:latin typeface="Menlo" panose="020B0609030804020204" pitchFamily="49" charset="0"/>
+              </a:rPr>
+              <a:t>_(</a:t>
+            </a:r>
+            <a:r>
+              <a:rPr lang="en-GB" dirty="0" err="1">
+                <a:solidFill>
+                  <a:srgbClr val="000000"/>
+                </a:solidFill>
+                <a:effectLst/>
+                <a:latin typeface="Menlo" panose="020B0609030804020204" pitchFamily="49" charset="0"/>
+              </a:rPr>
+              <a:t>is_Pressure</a:t>
+            </a:r>
+            <a:r>
+              <a:rPr lang="en-GB" dirty="0">
+                <a:solidFill>
+                  <a:srgbClr val="000000"/>
+                </a:solidFill>
+                <a:effectLst/>
+                <a:latin typeface="Menlo" panose="020B0609030804020204" pitchFamily="49" charset="0"/>
+              </a:rPr>
+              <a:t>(PA), </a:t>
+            </a:r>
+            <a:r>
+              <a:rPr lang="en-GB" dirty="0" err="1">
+                <a:solidFill>
+                  <a:srgbClr val="000000"/>
+                </a:solidFill>
+                <a:effectLst/>
+                <a:latin typeface="Menlo" panose="020B0609030804020204" pitchFamily="49" charset="0"/>
+              </a:rPr>
+              <a:t>si_dim_view</a:t>
+            </a:r>
+            <a:r>
+              <a:rPr lang="en-GB" dirty="0">
+                <a:solidFill>
+                  <a:srgbClr val="000000"/>
+                </a:solidFill>
+                <a:effectLst/>
+                <a:latin typeface="Menlo" panose="020B0609030804020204" pitchFamily="49" charset="0"/>
+              </a:rPr>
+              <a:t>(PA))</a:t>
+            </a:r>
+          </a:p>
+          <a:p>
+            <a:pPr marL="0" indent="0">
+              <a:buNone/>
+            </a:pPr>
+            <a:r>
+              <a:rPr lang="en-GB" dirty="0">
+                <a:solidFill>
+                  <a:srgbClr val="000000"/>
+                </a:solidFill>
+                <a:effectLst/>
+                <a:latin typeface="Menlo" panose="020B0609030804020204" pitchFamily="49" charset="0"/>
+              </a:rPr>
+              <a:t>           = </a:t>
+            </a:r>
+            <a:r>
+              <a:rPr lang="en-GB" dirty="0" err="1">
+                <a:solidFill>
+                  <a:srgbClr val="000000"/>
+                </a:solidFill>
+                <a:effectLst/>
+                <a:latin typeface="Menlo" panose="020B0609030804020204" pitchFamily="49" charset="0"/>
+              </a:rPr>
+              <a:t>mk</a:t>
+            </a:r>
+            <a:r>
+              <a:rPr lang="en-GB" dirty="0">
+                <a:solidFill>
+                  <a:srgbClr val="000000"/>
+                </a:solidFill>
+                <a:effectLst/>
+                <a:latin typeface="Menlo" panose="020B0609030804020204" pitchFamily="49" charset="0"/>
+              </a:rPr>
+              <a:t>_(           true, "kg  / ( m (s**2)  )")</a:t>
+            </a:r>
+          </a:p>
+          <a:p>
+            <a:pPr marL="0" indent="0">
+              <a:buNone/>
+            </a:pPr>
+            <a:endParaRPr lang="en-GB" dirty="0">
+              <a:solidFill>
+                <a:srgbClr val="000000"/>
+              </a:solidFill>
+              <a:effectLst/>
+              <a:latin typeface="Menlo" panose="020B0609030804020204" pitchFamily="49" charset="0"/>
+            </a:endParaRPr>
+          </a:p>
+          <a:p>
+            <a:pPr marL="0" indent="0">
+              <a:buNone/>
+            </a:pPr>
+            <a:r>
+              <a:rPr lang="en-GB" dirty="0">
+                <a:solidFill>
+                  <a:srgbClr val="000000"/>
+                </a:solidFill>
+                <a:effectLst/>
+                <a:latin typeface="Menlo" panose="020B0609030804020204" pitchFamily="49" charset="0"/>
+              </a:rPr>
+              <a:t>p let EPV = </a:t>
+            </a:r>
+            <a:r>
+              <a:rPr lang="en-GB" dirty="0" err="1">
+                <a:solidFill>
+                  <a:srgbClr val="000000"/>
+                </a:solidFill>
+                <a:effectLst/>
+                <a:latin typeface="Menlo" panose="020B0609030804020204" pitchFamily="49" charset="0"/>
+              </a:rPr>
+              <a:t>ms_times</a:t>
+            </a:r>
+            <a:r>
+              <a:rPr lang="en-GB" dirty="0">
+                <a:solidFill>
+                  <a:srgbClr val="000000"/>
+                </a:solidFill>
+                <a:effectLst/>
+                <a:latin typeface="Menlo" panose="020B0609030804020204" pitchFamily="49" charset="0"/>
+              </a:rPr>
+              <a:t>(PA, SI_VOLUME) in </a:t>
+            </a:r>
+          </a:p>
+          <a:p>
+            <a:pPr marL="0" indent="0">
+              <a:buNone/>
+            </a:pPr>
+            <a:r>
+              <a:rPr lang="en-GB" dirty="0">
+                <a:solidFill>
+                  <a:srgbClr val="000000"/>
+                </a:solidFill>
+                <a:effectLst/>
+                <a:latin typeface="Menlo" panose="020B0609030804020204" pitchFamily="49" charset="0"/>
+              </a:rPr>
+              <a:t>              </a:t>
+            </a:r>
+            <a:r>
+              <a:rPr lang="en-GB" dirty="0" err="1">
+                <a:solidFill>
+                  <a:srgbClr val="000000"/>
+                </a:solidFill>
+                <a:effectLst/>
+                <a:latin typeface="Menlo" panose="020B0609030804020204" pitchFamily="49" charset="0"/>
+              </a:rPr>
+              <a:t>mk</a:t>
+            </a:r>
+            <a:r>
+              <a:rPr lang="en-GB" dirty="0">
+                <a:solidFill>
+                  <a:srgbClr val="000000"/>
+                </a:solidFill>
+                <a:effectLst/>
+                <a:latin typeface="Menlo" panose="020B0609030804020204" pitchFamily="49" charset="0"/>
+              </a:rPr>
+              <a:t>_(</a:t>
+            </a:r>
+            <a:r>
+              <a:rPr lang="en-GB" dirty="0" err="1">
+                <a:solidFill>
+                  <a:srgbClr val="000000"/>
+                </a:solidFill>
+                <a:effectLst/>
+                <a:latin typeface="Menlo" panose="020B0609030804020204" pitchFamily="49" charset="0"/>
+              </a:rPr>
+              <a:t>is_Energy</a:t>
+            </a:r>
+            <a:r>
+              <a:rPr lang="en-GB" dirty="0">
+                <a:solidFill>
+                  <a:srgbClr val="000000"/>
+                </a:solidFill>
+                <a:effectLst/>
+                <a:latin typeface="Menlo" panose="020B0609030804020204" pitchFamily="49" charset="0"/>
+              </a:rPr>
+              <a:t>(EPV), </a:t>
+            </a:r>
+            <a:r>
+              <a:rPr lang="en-GB" dirty="0" err="1">
+                <a:solidFill>
+                  <a:srgbClr val="000000"/>
+                </a:solidFill>
+                <a:effectLst/>
+                <a:latin typeface="Menlo" panose="020B0609030804020204" pitchFamily="49" charset="0"/>
+              </a:rPr>
+              <a:t>si_dim_view</a:t>
+            </a:r>
+            <a:r>
+              <a:rPr lang="en-GB" dirty="0">
+                <a:solidFill>
+                  <a:srgbClr val="000000"/>
+                </a:solidFill>
+                <a:effectLst/>
+                <a:latin typeface="Menlo" panose="020B0609030804020204" pitchFamily="49" charset="0"/>
+              </a:rPr>
+              <a:t>(EPV))</a:t>
+            </a:r>
+          </a:p>
+          <a:p>
+            <a:pPr marL="0" indent="0">
+              <a:buNone/>
+            </a:pPr>
+            <a:r>
+              <a:rPr lang="en-GB" dirty="0">
+                <a:solidFill>
+                  <a:srgbClr val="000000"/>
+                </a:solidFill>
+                <a:effectLst/>
+                <a:latin typeface="Menlo" panose="020B0609030804020204" pitchFamily="49" charset="0"/>
+              </a:rPr>
+              <a:t>            = </a:t>
+            </a:r>
+            <a:r>
+              <a:rPr lang="en-GB" dirty="0" err="1">
+                <a:solidFill>
+                  <a:srgbClr val="000000"/>
+                </a:solidFill>
+                <a:effectLst/>
+                <a:latin typeface="Menlo" panose="020B0609030804020204" pitchFamily="49" charset="0"/>
+              </a:rPr>
+              <a:t>mk</a:t>
+            </a:r>
+            <a:r>
+              <a:rPr lang="en-GB" dirty="0">
+                <a:solidFill>
+                  <a:srgbClr val="000000"/>
+                </a:solidFill>
+                <a:effectLst/>
+                <a:latin typeface="Menlo" panose="020B0609030804020204" pitchFamily="49" charset="0"/>
+              </a:rPr>
+              <a:t>_(          true, "( (m**2) kg  ) / (s**2) ")</a:t>
+            </a:r>
+          </a:p>
+          <a:p>
+            <a:pPr marL="0" indent="0">
+              <a:buNone/>
+            </a:pPr>
+            <a:endParaRPr lang="en-GB" dirty="0"/>
+          </a:p>
+        </p:txBody>
+      </p:sp>
+      <p:sp>
+        <p:nvSpPr>
+          <p:cNvPr id="4" name="Slide Number Placeholder 3">
+            <a:extLst>
+              <a:ext uri="{FF2B5EF4-FFF2-40B4-BE49-F238E27FC236}">
+                <a16:creationId xmlns:a16="http://schemas.microsoft.com/office/drawing/2014/main" id="{23A0846B-0AF9-4F71-528C-A44160F932E5}"/>
+              </a:ext>
+            </a:extLst>
+          </p:cNvPr>
+          <p:cNvSpPr>
+            <a:spLocks noGrp="1"/>
+          </p:cNvSpPr>
+          <p:nvPr>
+            <p:ph type="sldNum" sz="quarter" idx="12"/>
+          </p:nvPr>
+        </p:nvSpPr>
+        <p:spPr/>
+        <p:txBody>
+          <a:bodyPr/>
+          <a:lstStyle/>
+          <a:p>
+            <a:fld id="{EC23855D-19AD-48A2-81F2-A97A89722104}" type="slidenum">
+              <a:rPr lang="en-GB" smtClean="0"/>
+              <a:t>13</a:t>
+            </a:fld>
+            <a:endParaRPr lang="en-GB"/>
+          </a:p>
+        </p:txBody>
+      </p:sp>
+      <p:cxnSp>
+        <p:nvCxnSpPr>
+          <p:cNvPr id="5" name="Straight Connector 4">
+            <a:extLst>
+              <a:ext uri="{FF2B5EF4-FFF2-40B4-BE49-F238E27FC236}">
+                <a16:creationId xmlns:a16="http://schemas.microsoft.com/office/drawing/2014/main" id="{051A073B-08EA-0B61-86B5-87FC96985587}"/>
+              </a:ext>
+            </a:extLst>
+          </p:cNvPr>
+          <p:cNvCxnSpPr>
+            <a:cxnSpLocks/>
+          </p:cNvCxnSpPr>
+          <p:nvPr/>
+        </p:nvCxnSpPr>
+        <p:spPr>
+          <a:xfrm>
+            <a:off x="922421" y="1368157"/>
+            <a:ext cx="3282215" cy="0"/>
+          </a:xfrm>
+          <a:prstGeom prst="line">
+            <a:avLst/>
+          </a:prstGeom>
+          <a:ln w="19050">
+            <a:solidFill>
+              <a:srgbClr val="195DA9"/>
+            </a:solidFill>
+          </a:ln>
+        </p:spPr>
+        <p:style>
+          <a:lnRef idx="1">
+            <a:schemeClr val="accent1"/>
+          </a:lnRef>
+          <a:fillRef idx="0">
+            <a:schemeClr val="accent1"/>
+          </a:fillRef>
+          <a:effectRef idx="0">
+            <a:schemeClr val="accent1"/>
+          </a:effectRef>
+          <a:fontRef idx="minor">
+            <a:schemeClr val="tx1"/>
+          </a:fontRef>
+        </p:style>
+      </p:cxnSp>
+    </p:spTree>
+    <p:extLst>
+      <p:ext uri="{BB962C8B-B14F-4D97-AF65-F5344CB8AC3E}">
+        <p14:creationId xmlns:p14="http://schemas.microsoft.com/office/powerpoint/2010/main" val="1435874195"/>
+      </p:ext>
+    </p:extLst>
+  </p:cSld>
+  <p:clrMapOvr>
+    <a:masterClrMapping/>
+  </p:clrMapOvr>
+  <p:timing>
+    <p:tnLst>
+      <p:par>
+        <p:cTn id="1" dur="indefinite" restart="never" nodeType="tmRoot">
+          <p:childTnLst>
+            <p:seq concurrent="1" nextAc="seek">
+              <p:cTn id="2" dur="indefinite" nodeType="mainSeq">
+                <p:childTnLst>
+                  <p:par>
+                    <p:cTn id="3" fill="hold">
+                      <p:stCondLst>
+                        <p:cond delay="indefinite"/>
+                      </p:stCondLst>
+                      <p:childTnLst>
+                        <p:par>
+                          <p:cTn id="4" fill="hold">
+                            <p:stCondLst>
+                              <p:cond delay="0"/>
+                            </p:stCondLst>
+                            <p:childTnLst>
+                              <p:par>
+                                <p:cTn id="5" presetID="1" presetClass="entr" presetSubtype="0" fill="hold" nodeType="clickEffect">
+                                  <p:stCondLst>
+                                    <p:cond delay="0"/>
+                                  </p:stCondLst>
+                                  <p:childTnLst>
+                                    <p:set>
+                                      <p:cBhvr>
+                                        <p:cTn id="6" dur="1" fill="hold">
+                                          <p:stCondLst>
+                                            <p:cond delay="0"/>
+                                          </p:stCondLst>
+                                        </p:cTn>
+                                        <p:tgtEl>
+                                          <p:spTgt spid="3">
+                                            <p:txEl>
+                                              <p:pRg st="0" end="0"/>
+                                            </p:txEl>
+                                          </p:spTgt>
+                                        </p:tgtEl>
+                                        <p:attrNameLst>
+                                          <p:attrName>style.visibility</p:attrName>
+                                        </p:attrNameLst>
+                                      </p:cBhvr>
+                                      <p:to>
+                                        <p:strVal val="visible"/>
+                                      </p:to>
+                                    </p:set>
+                                  </p:childTnLst>
+                                </p:cTn>
+                              </p:par>
+                            </p:childTnLst>
+                          </p:cTn>
+                        </p:par>
+                      </p:childTnLst>
+                    </p:cTn>
+                  </p:par>
+                  <p:par>
+                    <p:cTn id="7" fill="hold">
+                      <p:stCondLst>
+                        <p:cond delay="indefinite"/>
+                      </p:stCondLst>
+                      <p:childTnLst>
+                        <p:par>
+                          <p:cTn id="8" fill="hold">
+                            <p:stCondLst>
+                              <p:cond delay="0"/>
+                            </p:stCondLst>
+                            <p:childTnLst>
+                              <p:par>
+                                <p:cTn id="9" presetID="1" presetClass="entr" presetSubtype="0" fill="hold" nodeType="clickEffect">
+                                  <p:stCondLst>
+                                    <p:cond delay="0"/>
+                                  </p:stCondLst>
+                                  <p:childTnLst>
+                                    <p:set>
+                                      <p:cBhvr>
+                                        <p:cTn id="10" dur="1" fill="hold">
+                                          <p:stCondLst>
+                                            <p:cond delay="0"/>
+                                          </p:stCondLst>
+                                        </p:cTn>
+                                        <p:tgtEl>
+                                          <p:spTgt spid="3">
+                                            <p:txEl>
+                                              <p:pRg st="2" end="2"/>
+                                            </p:txEl>
+                                          </p:spTgt>
+                                        </p:tgtEl>
+                                        <p:attrNameLst>
+                                          <p:attrName>style.visibility</p:attrName>
+                                        </p:attrNameLst>
+                                      </p:cBhvr>
+                                      <p:to>
+                                        <p:strVal val="visible"/>
+                                      </p:to>
+                                    </p:set>
+                                  </p:childTnLst>
+                                </p:cTn>
+                              </p:par>
+                              <p:par>
+                                <p:cTn id="11" presetID="1" presetClass="entr" presetSubtype="0" fill="hold" nodeType="withEffect">
+                                  <p:stCondLst>
+                                    <p:cond delay="0"/>
+                                  </p:stCondLst>
+                                  <p:childTnLst>
+                                    <p:set>
+                                      <p:cBhvr>
+                                        <p:cTn id="12" dur="1" fill="hold">
+                                          <p:stCondLst>
+                                            <p:cond delay="0"/>
+                                          </p:stCondLst>
+                                        </p:cTn>
+                                        <p:tgtEl>
+                                          <p:spTgt spid="3">
+                                            <p:txEl>
+                                              <p:pRg st="3" end="3"/>
+                                            </p:txEl>
+                                          </p:spTgt>
+                                        </p:tgtEl>
+                                        <p:attrNameLst>
+                                          <p:attrName>style.visibility</p:attrName>
+                                        </p:attrNameLst>
+                                      </p:cBhvr>
+                                      <p:to>
+                                        <p:strVal val="visible"/>
+                                      </p:to>
+                                    </p:set>
+                                  </p:childTnLst>
+                                </p:cTn>
+                              </p:par>
+                              <p:par>
+                                <p:cTn id="13" presetID="1" presetClass="entr" presetSubtype="0" fill="hold" nodeType="withEffect">
+                                  <p:stCondLst>
+                                    <p:cond delay="0"/>
+                                  </p:stCondLst>
+                                  <p:childTnLst>
+                                    <p:set>
+                                      <p:cBhvr>
+                                        <p:cTn id="14" dur="1" fill="hold">
+                                          <p:stCondLst>
+                                            <p:cond delay="0"/>
+                                          </p:stCondLst>
+                                        </p:cTn>
+                                        <p:tgtEl>
+                                          <p:spTgt spid="3">
+                                            <p:txEl>
+                                              <p:pRg st="4" end="4"/>
+                                            </p:txEl>
+                                          </p:spTgt>
+                                        </p:tgtEl>
+                                        <p:attrNameLst>
+                                          <p:attrName>style.visibility</p:attrName>
+                                        </p:attrNameLst>
+                                      </p:cBhvr>
+                                      <p:to>
+                                        <p:strVal val="visible"/>
+                                      </p:to>
+                                    </p:set>
+                                  </p:childTnLst>
+                                </p:cTn>
+                              </p:par>
+                              <p:par>
+                                <p:cTn id="15" presetID="1" presetClass="entr" presetSubtype="0" fill="hold" nodeType="withEffect">
+                                  <p:stCondLst>
+                                    <p:cond delay="0"/>
+                                  </p:stCondLst>
+                                  <p:childTnLst>
+                                    <p:set>
+                                      <p:cBhvr>
+                                        <p:cTn id="16" dur="1" fill="hold">
+                                          <p:stCondLst>
+                                            <p:cond delay="0"/>
+                                          </p:stCondLst>
+                                        </p:cTn>
+                                        <p:tgtEl>
+                                          <p:spTgt spid="3">
+                                            <p:txEl>
+                                              <p:pRg st="5" end="5"/>
+                                            </p:txEl>
+                                          </p:spTgt>
+                                        </p:tgtEl>
+                                        <p:attrNameLst>
+                                          <p:attrName>style.visibility</p:attrName>
+                                        </p:attrNameLst>
+                                      </p:cBhvr>
+                                      <p:to>
+                                        <p:strVal val="visible"/>
+                                      </p:to>
+                                    </p:set>
+                                  </p:childTnLst>
+                                </p:cTn>
+                              </p:par>
+                            </p:childTnLst>
+                          </p:cTn>
+                        </p:par>
+                      </p:childTnLst>
+                    </p:cTn>
+                  </p:par>
+                  <p:par>
+                    <p:cTn id="17" fill="hold">
+                      <p:stCondLst>
+                        <p:cond delay="indefinite"/>
+                      </p:stCondLst>
+                      <p:childTnLst>
+                        <p:par>
+                          <p:cTn id="18" fill="hold">
+                            <p:stCondLst>
+                              <p:cond delay="0"/>
+                            </p:stCondLst>
+                            <p:childTnLst>
+                              <p:par>
+                                <p:cTn id="19" presetID="1" presetClass="entr" presetSubtype="0" fill="hold" nodeType="clickEffect">
+                                  <p:stCondLst>
+                                    <p:cond delay="0"/>
+                                  </p:stCondLst>
+                                  <p:childTnLst>
+                                    <p:set>
+                                      <p:cBhvr>
+                                        <p:cTn id="20" dur="1" fill="hold">
+                                          <p:stCondLst>
+                                            <p:cond delay="0"/>
+                                          </p:stCondLst>
+                                        </p:cTn>
+                                        <p:tgtEl>
+                                          <p:spTgt spid="3">
+                                            <p:txEl>
+                                              <p:pRg st="6" end="6"/>
+                                            </p:txEl>
+                                          </p:spTgt>
+                                        </p:tgtEl>
+                                        <p:attrNameLst>
+                                          <p:attrName>style.visibility</p:attrName>
+                                        </p:attrNameLst>
+                                      </p:cBhvr>
+                                      <p:to>
+                                        <p:strVal val="visible"/>
+                                      </p:to>
+                                    </p:set>
+                                  </p:childTnLst>
+                                </p:cTn>
+                              </p:par>
+                              <p:par>
+                                <p:cTn id="21" presetID="1" presetClass="entr" presetSubtype="0" fill="hold" nodeType="withEffect">
+                                  <p:stCondLst>
+                                    <p:cond delay="0"/>
+                                  </p:stCondLst>
+                                  <p:childTnLst>
+                                    <p:set>
+                                      <p:cBhvr>
+                                        <p:cTn id="22" dur="1" fill="hold">
+                                          <p:stCondLst>
+                                            <p:cond delay="0"/>
+                                          </p:stCondLst>
+                                        </p:cTn>
+                                        <p:tgtEl>
+                                          <p:spTgt spid="3">
+                                            <p:txEl>
+                                              <p:pRg st="7" end="7"/>
+                                            </p:txEl>
+                                          </p:spTgt>
+                                        </p:tgtEl>
+                                        <p:attrNameLst>
+                                          <p:attrName>style.visibility</p:attrName>
+                                        </p:attrNameLst>
+                                      </p:cBhvr>
+                                      <p:to>
+                                        <p:strVal val="visible"/>
+                                      </p:to>
+                                    </p:set>
+                                  </p:childTnLst>
+                                </p:cTn>
+                              </p:par>
+                              <p:par>
+                                <p:cTn id="23" presetID="1" presetClass="entr" presetSubtype="0" fill="hold" nodeType="withEffect">
+                                  <p:stCondLst>
+                                    <p:cond delay="0"/>
+                                  </p:stCondLst>
+                                  <p:childTnLst>
+                                    <p:set>
+                                      <p:cBhvr>
+                                        <p:cTn id="24" dur="1" fill="hold">
+                                          <p:stCondLst>
+                                            <p:cond delay="0"/>
+                                          </p:stCondLst>
+                                        </p:cTn>
+                                        <p:tgtEl>
+                                          <p:spTgt spid="3">
+                                            <p:txEl>
+                                              <p:pRg st="8" end="8"/>
+                                            </p:txEl>
+                                          </p:spTgt>
+                                        </p:tgtEl>
+                                        <p:attrNameLst>
+                                          <p:attrName>style.visibility</p:attrName>
+                                        </p:attrNameLst>
+                                      </p:cBhvr>
+                                      <p:to>
+                                        <p:strVal val="visible"/>
+                                      </p:to>
+                                    </p:set>
+                                  </p:childTnLst>
+                                </p:cTn>
+                              </p:par>
+                            </p:childTnLst>
+                          </p:cTn>
+                        </p:par>
+                      </p:childTnLst>
+                    </p:cTn>
+                  </p:par>
+                  <p:par>
+                    <p:cTn id="25" fill="hold">
+                      <p:stCondLst>
+                        <p:cond delay="indefinite"/>
+                      </p:stCondLst>
+                      <p:childTnLst>
+                        <p:par>
+                          <p:cTn id="26" fill="hold">
+                            <p:stCondLst>
+                              <p:cond delay="0"/>
+                            </p:stCondLst>
+                            <p:childTnLst>
+                              <p:par>
+                                <p:cTn id="27" presetID="1" presetClass="entr" presetSubtype="0" fill="hold" nodeType="clickEffect">
+                                  <p:stCondLst>
+                                    <p:cond delay="0"/>
+                                  </p:stCondLst>
+                                  <p:childTnLst>
+                                    <p:set>
+                                      <p:cBhvr>
+                                        <p:cTn id="28" dur="1" fill="hold">
+                                          <p:stCondLst>
+                                            <p:cond delay="0"/>
+                                          </p:stCondLst>
+                                        </p:cTn>
+                                        <p:tgtEl>
+                                          <p:spTgt spid="3">
+                                            <p:txEl>
+                                              <p:pRg st="10" end="10"/>
+                                            </p:txEl>
+                                          </p:spTgt>
+                                        </p:tgtEl>
+                                        <p:attrNameLst>
+                                          <p:attrName>style.visibility</p:attrName>
+                                        </p:attrNameLst>
+                                      </p:cBhvr>
+                                      <p:to>
+                                        <p:strVal val="visible"/>
+                                      </p:to>
+                                    </p:set>
+                                  </p:childTnLst>
+                                </p:cTn>
+                              </p:par>
+                              <p:par>
+                                <p:cTn id="29" presetID="1" presetClass="entr" presetSubtype="0" fill="hold" nodeType="withEffect">
+                                  <p:stCondLst>
+                                    <p:cond delay="0"/>
+                                  </p:stCondLst>
+                                  <p:childTnLst>
+                                    <p:set>
+                                      <p:cBhvr>
+                                        <p:cTn id="30" dur="1" fill="hold">
+                                          <p:stCondLst>
+                                            <p:cond delay="0"/>
+                                          </p:stCondLst>
+                                        </p:cTn>
+                                        <p:tgtEl>
+                                          <p:spTgt spid="3">
+                                            <p:txEl>
+                                              <p:pRg st="11" end="11"/>
+                                            </p:txEl>
+                                          </p:spTgt>
+                                        </p:tgtEl>
+                                        <p:attrNameLst>
+                                          <p:attrName>style.visibility</p:attrName>
+                                        </p:attrNameLst>
+                                      </p:cBhvr>
+                                      <p:to>
+                                        <p:strVal val="visible"/>
+                                      </p:to>
+                                    </p:set>
+                                  </p:childTnLst>
+                                </p:cTn>
+                              </p:par>
+                              <p:par>
+                                <p:cTn id="31" presetID="1" presetClass="entr" presetSubtype="0" fill="hold" nodeType="withEffect">
+                                  <p:stCondLst>
+                                    <p:cond delay="0"/>
+                                  </p:stCondLst>
+                                  <p:childTnLst>
+                                    <p:set>
+                                      <p:cBhvr>
+                                        <p:cTn id="32" dur="1" fill="hold">
+                                          <p:stCondLst>
+                                            <p:cond delay="0"/>
+                                          </p:stCondLst>
+                                        </p:cTn>
+                                        <p:tgtEl>
+                                          <p:spTgt spid="3">
+                                            <p:txEl>
+                                              <p:pRg st="12" end="12"/>
+                                            </p:txEl>
+                                          </p:spTgt>
+                                        </p:tgtEl>
+                                        <p:attrNameLst>
+                                          <p:attrName>style.visibility</p:attrName>
+                                        </p:attrNameLst>
+                                      </p:cBhvr>
+                                      <p:to>
+                                        <p:strVal val="visible"/>
+                                      </p:to>
+                                    </p:set>
+                                  </p:childTnLst>
+                                </p:cTn>
+                              </p:par>
+                            </p:childTnLst>
+                          </p:cTn>
+                        </p:par>
+                      </p:childTnLst>
+                    </p:cTn>
+                  </p:par>
+                </p:childTnLst>
+              </p:cTn>
+              <p:prevCondLst>
+                <p:cond evt="onPrev" delay="0">
+                  <p:tgtEl>
+                    <p:sldTgt/>
+                  </p:tgtEl>
+                </p:cond>
+              </p:prevCondLst>
+              <p:nextCondLst>
+                <p:cond evt="onNext" delay="0">
+                  <p:tgtEl>
+                    <p:sldTgt/>
+                  </p:tgtEl>
+                </p:cond>
+              </p:nextCondLst>
+            </p:seq>
+          </p:childTnLst>
+        </p:cTn>
+      </p:par>
+    </p:tnLst>
+  </p:timing>
+</p:sld>
+</file>
+
+<file path=ppt/slides/slide14.xml><?xml version="1.0" encoding="utf-8"?>
+<p:sld xmlns:a="http://schemas.openxmlformats.org/drawingml/2006/main" xmlns:r="http://schemas.openxmlformats.org/officeDocument/2006/relationships" xmlns:p="http://schemas.openxmlformats.org/presentationml/2006/main">
+  <p:cSld>
+    <p:spTree>
+      <p:nvGrpSpPr>
+        <p:cNvPr id="1" name=""/>
+        <p:cNvGrpSpPr/>
+        <p:nvPr/>
+      </p:nvGrpSpPr>
+      <p:grpSpPr>
+        <a:xfrm>
+          <a:off x="0" y="0"/>
+          <a:ext cx="0" cy="0"/>
+          <a:chOff x="0" y="0"/>
+          <a:chExt cx="0" cy="0"/>
+        </a:xfrm>
+      </p:grpSpPr>
+      <p:sp>
+        <p:nvSpPr>
+          <p:cNvPr id="2" name="Title 1">
+            <a:extLst>
+              <a:ext uri="{FF2B5EF4-FFF2-40B4-BE49-F238E27FC236}">
+                <a16:creationId xmlns:a16="http://schemas.microsoft.com/office/drawing/2014/main" id="{4B2E67CF-F5FF-8245-E7D5-8DC46E37394B}"/>
+              </a:ext>
+            </a:extLst>
+          </p:cNvPr>
+          <p:cNvSpPr>
+            <a:spLocks noGrp="1"/>
+          </p:cNvSpPr>
+          <p:nvPr>
+            <p:ph type="title"/>
+          </p:nvPr>
+        </p:nvSpPr>
+        <p:spPr/>
+        <p:txBody>
+          <a:bodyPr/>
+          <a:lstStyle/>
+          <a:p>
+            <a:r>
+              <a:rPr lang="en-GB" dirty="0"/>
               <a:t>Origins and Applications</a:t>
             </a:r>
           </a:p>
@@ -12689,7 +13859,7 @@
           <a:p>
             <a:fld id="{EC23855D-19AD-48A2-81F2-A97A89722104}" type="slidenum">
               <a:rPr lang="en-GB" smtClean="0"/>
-              <a:t>13</a:t>
+              <a:t>14</a:t>
             </a:fld>
             <a:endParaRPr lang="en-GB"/>
           </a:p>
@@ -12751,7 +13921,7 @@
 </p:sld>
 </file>
 
-<file path=ppt/slides/slide14.xml><?xml version="1.0" encoding="utf-8"?>
+<file path=ppt/slides/slide15.xml><?xml version="1.0" encoding="utf-8"?>
 <p:sld xmlns:a="http://schemas.openxmlformats.org/drawingml/2006/main" xmlns:r="http://schemas.openxmlformats.org/officeDocument/2006/relationships" xmlns:p="http://schemas.openxmlformats.org/presentationml/2006/main">
   <p:cSld>
     <p:spTree>
@@ -12790,9 +13960,10 @@
           <a:lstStyle/>
           <a:p>
             <a:r>
-              <a:rPr lang="en-GB" dirty="0"/>
-              <a:t>Future Works</a:t>
-            </a:r>
+              <a:rPr lang="en-GB"/>
+              <a:t>Future Work</a:t>
+            </a:r>
+            <a:endParaRPr lang="en-GB" dirty="0"/>
           </a:p>
         </p:txBody>
       </p:sp>
@@ -12857,7 +14028,7 @@
                   </a:schemeClr>
                 </a:solidFill>
               </a:rPr>
-              <a:t>14</a:t>
+              <a:t>15</a:t>
             </a:fld>
             <a:endParaRPr lang="en-GB" dirty="0">
               <a:solidFill>
@@ -12962,7 +14133,7 @@
 </p:sld>
 </file>
 
-<file path=ppt/slides/slide15.xml><?xml version="1.0" encoding="utf-8"?>
+<file path=ppt/slides/slide16.xml><?xml version="1.0" encoding="utf-8"?>
 <p:sld xmlns:a="http://schemas.openxmlformats.org/drawingml/2006/main" xmlns:r="http://schemas.openxmlformats.org/officeDocument/2006/relationships" xmlns:p="http://schemas.openxmlformats.org/presentationml/2006/main">
   <p:cSld>
     <p:spTree>
@@ -13047,7 +14218,7 @@
           <a:p>
             <a:fld id="{EC23855D-19AD-48A2-81F2-A97A89722104}" type="slidenum">
               <a:rPr lang="en-GB" smtClean="0"/>
-              <a:t>15</a:t>
+              <a:t>16</a:t>
             </a:fld>
             <a:endParaRPr lang="en-GB"/>
           </a:p>

</xml_diff>

<commit_message>
talk final comments after
</commit_message>
<xml_diff>
--- a/plugins/vdm2isa/pub/isq-lib/talk/International System of Quantities library in VDM.pptx
+++ b/plugins/vdm2isa/pub/isq-lib/talk/International System of Quantities library in VDM.pptx
@@ -1981,7 +1981,7 @@
   <dgm:whole/>
   <dgm:extLst>
     <a:ext uri="http://schemas.microsoft.com/office/drawing/2008/diagram">
-      <dsp:dataModelExt xmlns:dsp="http://schemas.microsoft.com/office/drawing/2008/diagram" relId="rId6" minVer="http://schemas.openxmlformats.org/drawingml/2006/diagram"/>
+      <dsp:dataModelExt xmlns:dsp="http://schemas.microsoft.com/office/drawing/2008/diagram" relId="rId7" minVer="http://schemas.openxmlformats.org/drawingml/2006/diagram"/>
     </a:ext>
     <a:ext uri="{C62137D5-CB1D-491B-B009-E17868A290BF}">
       <dgm14:recolorImg xmlns:dgm14="http://schemas.microsoft.com/office/drawing/2010/diagram" val="1"/>
@@ -5576,7 +5576,7 @@
           <a:p>
             <a:fld id="{6E38A9DC-9E25-4685-838D-AB5A97295B66}" type="datetimeFigureOut">
               <a:rPr lang="en-GB" smtClean="0"/>
-              <a:t>09/03/2023</a:t>
+              <a:t>10/03/2023</a:t>
             </a:fld>
             <a:endParaRPr lang="en-GB"/>
           </a:p>
@@ -5978,18 +5978,19 @@
           <a:bodyPr/>
           <a:lstStyle/>
           <a:p>
-            <a:r>
-              <a:rPr lang="en-US" dirty="0"/>
-              <a:t>* SI = Standard </a:t>
-            </a:r>
-            <a:r>
-              <a:rPr lang="en-US" dirty="0" err="1"/>
-              <a:t>Internationalle</a:t>
-            </a:r>
-            <a:r>
-              <a:rPr lang="en-US" dirty="0"/>
-              <a:t> </a:t>
-            </a:r>
+            <a:pPr lvl="1"/>
+            <a:r>
+              <a:rPr lang="en-GB" dirty="0"/>
+              <a:t>Prescription given as 8mg of medicine X every 8 hours for 3 weeks </a:t>
+            </a:r>
+          </a:p>
+          <a:p>
+            <a:pPr lvl="1"/>
+            <a:r>
+              <a:rPr lang="en-GB" dirty="0"/>
+              <a:t>Yet BNF (British National Formulary) given as 2.4g of X every 24hrs per month</a:t>
+            </a:r>
+            <a:endParaRPr lang="en-US" dirty="0"/>
           </a:p>
         </p:txBody>
       </p:sp>
@@ -6010,7 +6011,7 @@
           <a:p>
             <a:fld id="{D00BF331-F628-4B97-BDB6-EA182D3A9391}" type="slidenum">
               <a:rPr lang="en-GB" smtClean="0"/>
-              <a:t>3</a:t>
+              <a:t>2</a:t>
             </a:fld>
             <a:endParaRPr lang="en-GB"/>
           </a:p>
@@ -6019,7 +6020,7 @@
     </p:spTree>
     <p:extLst>
       <p:ext uri="{BB962C8B-B14F-4D97-AF65-F5344CB8AC3E}">
-        <p14:creationId xmlns:p14="http://schemas.microsoft.com/office/powerpoint/2010/main" val="1889338281"/>
+        <p14:creationId xmlns:p14="http://schemas.microsoft.com/office/powerpoint/2010/main" val="4054791746"/>
       </p:ext>
     </p:extLst>
   </p:cSld>
@@ -6073,9 +6074,31 @@
           <a:bodyPr/>
           <a:lstStyle/>
           <a:p>
+            <a:pPr marL="171450" indent="-171450">
+              <a:buFont typeface="Arial" panose="020B0604020202020204" pitchFamily="34" charset="0"/>
+              <a:buChar char="•"/>
+            </a:pPr>
             <a:r>
               <a:rPr lang="en-US" dirty="0"/>
-              <a:t>ISQ are base unit relationships</a:t>
+              <a:t>SI = Standard </a:t>
+            </a:r>
+            <a:r>
+              <a:rPr lang="en-US" dirty="0" err="1"/>
+              <a:t>Internationalle</a:t>
+            </a:r>
+            <a:r>
+              <a:rPr lang="en-US" dirty="0"/>
+              <a:t> </a:t>
+            </a:r>
+          </a:p>
+          <a:p>
+            <a:pPr marL="171450" indent="-171450">
+              <a:buFont typeface="Arial" panose="020B0604020202020204" pitchFamily="34" charset="0"/>
+              <a:buChar char="•"/>
+            </a:pPr>
+            <a:r>
+              <a:rPr lang="en-US" dirty="0"/>
+              <a:t>Mention original work with NPL</a:t>
             </a:r>
           </a:p>
         </p:txBody>
@@ -6097,7 +6120,7 @@
           <a:p>
             <a:fld id="{D00BF331-F628-4B97-BDB6-EA182D3A9391}" type="slidenum">
               <a:rPr lang="en-GB" smtClean="0"/>
-              <a:t>4</a:t>
+              <a:t>3</a:t>
             </a:fld>
             <a:endParaRPr lang="en-GB"/>
           </a:p>
@@ -6106,7 +6129,7 @@
     </p:spTree>
     <p:extLst>
       <p:ext uri="{BB962C8B-B14F-4D97-AF65-F5344CB8AC3E}">
-        <p14:creationId xmlns:p14="http://schemas.microsoft.com/office/powerpoint/2010/main" val="2952233912"/>
+        <p14:creationId xmlns:p14="http://schemas.microsoft.com/office/powerpoint/2010/main" val="1889338281"/>
       </p:ext>
     </p:extLst>
   </p:cSld>
@@ -6162,40 +6185,8 @@
           <a:p>
             <a:r>
               <a:rPr lang="en-US" dirty="0"/>
-              <a:t>SI = length=m, temperature=</a:t>
-            </a:r>
-            <a:r>
-              <a:rPr lang="en-US" dirty="0" err="1"/>
-              <a:t>celcuis</a:t>
-            </a:r>
-            <a:r>
-              <a:rPr lang="en-US" dirty="0"/>
-              <a:t>, mass=kilogram, </a:t>
-            </a:r>
-            <a:r>
-              <a:rPr lang="en-US" dirty="0" err="1"/>
-              <a:t>etc</a:t>
-            </a:r>
-            <a:endParaRPr lang="en-US" dirty="0"/>
-          </a:p>
-          <a:p>
-            <a:r>
-              <a:rPr lang="en-US" dirty="0"/>
-              <a:t>BSI = length=yard, temperature=</a:t>
-            </a:r>
-            <a:r>
-              <a:rPr lang="en-US" dirty="0" err="1"/>
-              <a:t>rankine</a:t>
-            </a:r>
-            <a:r>
-              <a:rPr lang="en-US" dirty="0"/>
-              <a:t>, mass=pound </a:t>
-            </a:r>
-            <a:r>
-              <a:rPr lang="en-US" dirty="0" err="1"/>
-              <a:t>etc</a:t>
-            </a:r>
-            <a:endParaRPr lang="en-US" dirty="0"/>
+              <a:t>ISQ are base unit relationships</a:t>
+            </a:r>
           </a:p>
         </p:txBody>
       </p:sp>
@@ -6216,6 +6207,125 @@
           <a:p>
             <a:fld id="{D00BF331-F628-4B97-BDB6-EA182D3A9391}" type="slidenum">
               <a:rPr lang="en-GB" smtClean="0"/>
+              <a:t>4</a:t>
+            </a:fld>
+            <a:endParaRPr lang="en-GB"/>
+          </a:p>
+        </p:txBody>
+      </p:sp>
+    </p:spTree>
+    <p:extLst>
+      <p:ext uri="{BB962C8B-B14F-4D97-AF65-F5344CB8AC3E}">
+        <p14:creationId xmlns:p14="http://schemas.microsoft.com/office/powerpoint/2010/main" val="2952233912"/>
+      </p:ext>
+    </p:extLst>
+  </p:cSld>
+  <p:clrMapOvr>
+    <a:masterClrMapping/>
+  </p:clrMapOvr>
+</p:notes>
+</file>
+
+<file path=ppt/notesSlides/notesSlide5.xml><?xml version="1.0" encoding="utf-8"?>
+<p:notes xmlns:a="http://schemas.openxmlformats.org/drawingml/2006/main" xmlns:r="http://schemas.openxmlformats.org/officeDocument/2006/relationships" xmlns:p="http://schemas.openxmlformats.org/presentationml/2006/main">
+  <p:cSld>
+    <p:spTree>
+      <p:nvGrpSpPr>
+        <p:cNvPr id="1" name=""/>
+        <p:cNvGrpSpPr/>
+        <p:nvPr/>
+      </p:nvGrpSpPr>
+      <p:grpSpPr>
+        <a:xfrm>
+          <a:off x="0" y="0"/>
+          <a:ext cx="0" cy="0"/>
+          <a:chOff x="0" y="0"/>
+          <a:chExt cx="0" cy="0"/>
+        </a:xfrm>
+      </p:grpSpPr>
+      <p:sp>
+        <p:nvSpPr>
+          <p:cNvPr id="2" name="Slide Image Placeholder 1"/>
+          <p:cNvSpPr>
+            <a:spLocks noGrp="1" noRot="1" noChangeAspect="1"/>
+          </p:cNvSpPr>
+          <p:nvPr>
+            <p:ph type="sldImg"/>
+          </p:nvPr>
+        </p:nvSpPr>
+        <p:spPr/>
+      </p:sp>
+      <p:sp>
+        <p:nvSpPr>
+          <p:cNvPr id="3" name="Notes Placeholder 2"/>
+          <p:cNvSpPr>
+            <a:spLocks noGrp="1"/>
+          </p:cNvSpPr>
+          <p:nvPr>
+            <p:ph type="body" idx="1"/>
+          </p:nvPr>
+        </p:nvSpPr>
+        <p:spPr/>
+        <p:txBody>
+          <a:bodyPr/>
+          <a:lstStyle/>
+          <a:p>
+            <a:r>
+              <a:rPr lang="en-US" dirty="0"/>
+              <a:t>SI = length=m, temperature=</a:t>
+            </a:r>
+            <a:r>
+              <a:rPr lang="en-US" dirty="0" err="1"/>
+              <a:t>celcuis</a:t>
+            </a:r>
+            <a:r>
+              <a:rPr lang="en-US" dirty="0"/>
+              <a:t>, mass=kilogram, </a:t>
+            </a:r>
+            <a:r>
+              <a:rPr lang="en-US" dirty="0" err="1"/>
+              <a:t>etc</a:t>
+            </a:r>
+            <a:endParaRPr lang="en-US" dirty="0"/>
+          </a:p>
+          <a:p>
+            <a:r>
+              <a:rPr lang="en-US" dirty="0"/>
+              <a:t>BSI = length=yard, temperature=</a:t>
+            </a:r>
+            <a:r>
+              <a:rPr lang="en-US" dirty="0" err="1"/>
+              <a:t>rankine</a:t>
+            </a:r>
+            <a:r>
+              <a:rPr lang="en-US" dirty="0"/>
+              <a:t>, mass=pound </a:t>
+            </a:r>
+            <a:r>
+              <a:rPr lang="en-US" dirty="0" err="1"/>
+              <a:t>etc</a:t>
+            </a:r>
+            <a:endParaRPr lang="en-US" dirty="0"/>
+          </a:p>
+        </p:txBody>
+      </p:sp>
+      <p:sp>
+        <p:nvSpPr>
+          <p:cNvPr id="4" name="Slide Number Placeholder 3"/>
+          <p:cNvSpPr>
+            <a:spLocks noGrp="1"/>
+          </p:cNvSpPr>
+          <p:nvPr>
+            <p:ph type="sldNum" sz="quarter" idx="5"/>
+          </p:nvPr>
+        </p:nvSpPr>
+        <p:spPr/>
+        <p:txBody>
+          <a:bodyPr/>
+          <a:lstStyle/>
+          <a:p>
+            <a:fld id="{D00BF331-F628-4B97-BDB6-EA182D3A9391}" type="slidenum">
+              <a:rPr lang="en-GB" smtClean="0"/>
               <a:t>6</a:t>
             </a:fld>
             <a:endParaRPr lang="en-GB"/>
@@ -6235,7 +6345,7 @@
 </p:notes>
 </file>
 
-<file path=ppt/notesSlides/notesSlide5.xml><?xml version="1.0" encoding="utf-8"?>
+<file path=ppt/notesSlides/notesSlide6.xml><?xml version="1.0" encoding="utf-8"?>
 <p:notes xmlns:a="http://schemas.openxmlformats.org/drawingml/2006/main" xmlns:r="http://schemas.openxmlformats.org/officeDocument/2006/relationships" xmlns:p="http://schemas.openxmlformats.org/presentationml/2006/main">
   <p:cSld>
     <p:spTree>
@@ -6471,7 +6581,7 @@
           <a:p>
             <a:fld id="{76BA3A6F-BBBE-436E-BB97-5B6DF122B556}" type="datetime1">
               <a:rPr lang="en-GB" smtClean="0"/>
-              <a:t>09/03/2023</a:t>
+              <a:t>10/03/2023</a:t>
             </a:fld>
             <a:endParaRPr lang="en-GB"/>
           </a:p>
@@ -6671,7 +6781,7 @@
           <a:p>
             <a:fld id="{106653B1-8131-4A6A-AB9C-1B28906E5FEE}" type="datetime1">
               <a:rPr lang="en-GB" smtClean="0"/>
-              <a:t>09/03/2023</a:t>
+              <a:t>10/03/2023</a:t>
             </a:fld>
             <a:endParaRPr lang="en-GB"/>
           </a:p>
@@ -6881,7 +6991,7 @@
           <a:p>
             <a:fld id="{47D19019-6859-4879-8AA6-4F38C4CE2845}" type="datetime1">
               <a:rPr lang="en-GB" smtClean="0"/>
-              <a:t>09/03/2023</a:t>
+              <a:t>10/03/2023</a:t>
             </a:fld>
             <a:endParaRPr lang="en-GB"/>
           </a:p>
@@ -7081,7 +7191,7 @@
           <a:p>
             <a:fld id="{3DE72EEC-4252-4E73-8225-170A8383FE1B}" type="datetime1">
               <a:rPr lang="en-GB" smtClean="0"/>
-              <a:t>09/03/2023</a:t>
+              <a:t>10/03/2023</a:t>
             </a:fld>
             <a:endParaRPr lang="en-GB"/>
           </a:p>
@@ -7357,7 +7467,7 @@
           <a:p>
             <a:fld id="{BCF9D066-5873-442E-81C1-798E97D368C4}" type="datetime1">
               <a:rPr lang="en-GB" smtClean="0"/>
-              <a:t>09/03/2023</a:t>
+              <a:t>10/03/2023</a:t>
             </a:fld>
             <a:endParaRPr lang="en-GB"/>
           </a:p>
@@ -7625,7 +7735,7 @@
           <a:p>
             <a:fld id="{259DAECF-0D0C-4D26-8816-3E375E6DDDE1}" type="datetime1">
               <a:rPr lang="en-GB" smtClean="0"/>
-              <a:t>09/03/2023</a:t>
+              <a:t>10/03/2023</a:t>
             </a:fld>
             <a:endParaRPr lang="en-GB"/>
           </a:p>
@@ -8040,7 +8150,7 @@
           <a:p>
             <a:fld id="{7ED82D9C-D78C-456A-B535-5A7B6456CBE0}" type="datetime1">
               <a:rPr lang="en-GB" smtClean="0"/>
-              <a:t>09/03/2023</a:t>
+              <a:t>10/03/2023</a:t>
             </a:fld>
             <a:endParaRPr lang="en-GB"/>
           </a:p>
@@ -8182,7 +8292,7 @@
           <a:p>
             <a:fld id="{01C34CFD-872B-4AF2-9E66-74021F29E875}" type="datetime1">
               <a:rPr lang="en-GB" smtClean="0"/>
-              <a:t>09/03/2023</a:t>
+              <a:t>10/03/2023</a:t>
             </a:fld>
             <a:endParaRPr lang="en-GB"/>
           </a:p>
@@ -8295,7 +8405,7 @@
           <a:p>
             <a:fld id="{6FFA839B-BDF8-4769-8D67-FA57AE014E53}" type="datetime1">
               <a:rPr lang="en-GB" smtClean="0"/>
-              <a:t>09/03/2023</a:t>
+              <a:t>10/03/2023</a:t>
             </a:fld>
             <a:endParaRPr lang="en-GB"/>
           </a:p>
@@ -8608,7 +8718,7 @@
           <a:p>
             <a:fld id="{3B2B6CA8-E50F-45F8-B86F-33C95EF8D81F}" type="datetime1">
               <a:rPr lang="en-GB" smtClean="0"/>
-              <a:t>09/03/2023</a:t>
+              <a:t>10/03/2023</a:t>
             </a:fld>
             <a:endParaRPr lang="en-GB"/>
           </a:p>
@@ -8897,7 +9007,7 @@
           <a:p>
             <a:fld id="{217FF8D2-F24E-40FD-A84F-A85975E72917}" type="datetime1">
               <a:rPr lang="en-GB" smtClean="0"/>
-              <a:t>09/03/2023</a:t>
+              <a:t>10/03/2023</a:t>
             </a:fld>
             <a:endParaRPr lang="en-GB"/>
           </a:p>
@@ -9140,7 +9250,7 @@
           <a:p>
             <a:fld id="{1A2DE837-6299-448E-95CE-52ABCF7B0F1E}" type="datetime1">
               <a:rPr lang="en-GB" smtClean="0"/>
-              <a:t>09/03/2023</a:t>
+              <a:t>10/03/2023</a:t>
             </a:fld>
             <a:endParaRPr lang="en-GB"/>
           </a:p>
@@ -14309,7 +14419,7 @@
         </p:xfrm>
         <a:graphic>
           <a:graphicData uri="http://schemas.openxmlformats.org/drawingml/2006/diagram">
-            <dgm:relIds xmlns:dgm="http://schemas.openxmlformats.org/drawingml/2006/diagram" xmlns:r="http://schemas.openxmlformats.org/officeDocument/2006/relationships" r:dm="rId2" r:lo="rId3" r:qs="rId4" r:cs="rId5"/>
+            <dgm:relIds xmlns:dgm="http://schemas.openxmlformats.org/drawingml/2006/diagram" xmlns:r="http://schemas.openxmlformats.org/officeDocument/2006/relationships" r:dm="rId3" r:lo="rId4" r:qs="rId5" r:cs="rId6"/>
           </a:graphicData>
         </a:graphic>
       </p:graphicFrame>
@@ -14371,7 +14481,7 @@
           <p:nvPr/>
         </p:nvPicPr>
         <p:blipFill>
-          <a:blip r:embed="rId7">
+          <a:blip r:embed="rId8">
             <a:extLst>
               <a:ext uri="{28A0092B-C50C-407E-A947-70E740481C1C}">
                 <a14:useLocalDpi xmlns:a14="http://schemas.microsoft.com/office/drawing/2010/main" val="0"/>

</xml_diff>